<commit_message>
Testing modules with ModelSim timing simulator
</commit_message>
<xml_diff>
--- a/Architecture/Architecture Specs/Instruction_Pipeline.pptx
+++ b/Architecture/Architecture Specs/Instruction_Pipeline.pptx
@@ -289,7 +289,7 @@
           <a:p>
             <a:fld id="{15E92DAA-4A79-476E-9D81-A0A71DC339B1}" type="datetimeFigureOut">
               <a:rPr lang="en-US" smtClean="0"/>
-              <a:t>5/14/2019</a:t>
+              <a:t>5/15/2019</a:t>
             </a:fld>
             <a:endParaRPr lang="en-US"/>
           </a:p>
@@ -459,7 +459,7 @@
           <a:p>
             <a:fld id="{15E92DAA-4A79-476E-9D81-A0A71DC339B1}" type="datetimeFigureOut">
               <a:rPr lang="en-US" smtClean="0"/>
-              <a:t>5/14/2019</a:t>
+              <a:t>5/15/2019</a:t>
             </a:fld>
             <a:endParaRPr lang="en-US"/>
           </a:p>
@@ -639,7 +639,7 @@
           <a:p>
             <a:fld id="{15E92DAA-4A79-476E-9D81-A0A71DC339B1}" type="datetimeFigureOut">
               <a:rPr lang="en-US" smtClean="0"/>
-              <a:t>5/14/2019</a:t>
+              <a:t>5/15/2019</a:t>
             </a:fld>
             <a:endParaRPr lang="en-US"/>
           </a:p>
@@ -809,7 +809,7 @@
           <a:p>
             <a:fld id="{15E92DAA-4A79-476E-9D81-A0A71DC339B1}" type="datetimeFigureOut">
               <a:rPr lang="en-US" smtClean="0"/>
-              <a:t>5/14/2019</a:t>
+              <a:t>5/15/2019</a:t>
             </a:fld>
             <a:endParaRPr lang="en-US"/>
           </a:p>
@@ -1055,7 +1055,7 @@
           <a:p>
             <a:fld id="{15E92DAA-4A79-476E-9D81-A0A71DC339B1}" type="datetimeFigureOut">
               <a:rPr lang="en-US" smtClean="0"/>
-              <a:t>5/14/2019</a:t>
+              <a:t>5/15/2019</a:t>
             </a:fld>
             <a:endParaRPr lang="en-US"/>
           </a:p>
@@ -1343,7 +1343,7 @@
           <a:p>
             <a:fld id="{15E92DAA-4A79-476E-9D81-A0A71DC339B1}" type="datetimeFigureOut">
               <a:rPr lang="en-US" smtClean="0"/>
-              <a:t>5/14/2019</a:t>
+              <a:t>5/15/2019</a:t>
             </a:fld>
             <a:endParaRPr lang="en-US"/>
           </a:p>
@@ -1765,7 +1765,7 @@
           <a:p>
             <a:fld id="{15E92DAA-4A79-476E-9D81-A0A71DC339B1}" type="datetimeFigureOut">
               <a:rPr lang="en-US" smtClean="0"/>
-              <a:t>5/14/2019</a:t>
+              <a:t>5/15/2019</a:t>
             </a:fld>
             <a:endParaRPr lang="en-US"/>
           </a:p>
@@ -1883,7 +1883,7 @@
           <a:p>
             <a:fld id="{15E92DAA-4A79-476E-9D81-A0A71DC339B1}" type="datetimeFigureOut">
               <a:rPr lang="en-US" smtClean="0"/>
-              <a:t>5/14/2019</a:t>
+              <a:t>5/15/2019</a:t>
             </a:fld>
             <a:endParaRPr lang="en-US"/>
           </a:p>
@@ -1978,7 +1978,7 @@
           <a:p>
             <a:fld id="{15E92DAA-4A79-476E-9D81-A0A71DC339B1}" type="datetimeFigureOut">
               <a:rPr lang="en-US" smtClean="0"/>
-              <a:t>5/14/2019</a:t>
+              <a:t>5/15/2019</a:t>
             </a:fld>
             <a:endParaRPr lang="en-US"/>
           </a:p>
@@ -2255,7 +2255,7 @@
           <a:p>
             <a:fld id="{15E92DAA-4A79-476E-9D81-A0A71DC339B1}" type="datetimeFigureOut">
               <a:rPr lang="en-US" smtClean="0"/>
-              <a:t>5/14/2019</a:t>
+              <a:t>5/15/2019</a:t>
             </a:fld>
             <a:endParaRPr lang="en-US"/>
           </a:p>
@@ -2508,7 +2508,7 @@
           <a:p>
             <a:fld id="{15E92DAA-4A79-476E-9D81-A0A71DC339B1}" type="datetimeFigureOut">
               <a:rPr lang="en-US" smtClean="0"/>
-              <a:t>5/14/2019</a:t>
+              <a:t>5/15/2019</a:t>
             </a:fld>
             <a:endParaRPr lang="en-US"/>
           </a:p>
@@ -2721,7 +2721,7 @@
           <a:p>
             <a:fld id="{15E92DAA-4A79-476E-9D81-A0A71DC339B1}" type="datetimeFigureOut">
               <a:rPr lang="en-US" smtClean="0"/>
-              <a:t>5/14/2019</a:t>
+              <a:t>5/15/2019</a:t>
             </a:fld>
             <a:endParaRPr lang="en-US"/>
           </a:p>
@@ -3187,493 +3187,1105 @@
           </a:p>
         </p:txBody>
       </p:sp>
-      <p:grpSp>
-        <p:nvGrpSpPr>
-          <p:cNvPr id="15" name="Group 14"/>
-          <p:cNvGrpSpPr/>
+      <p:sp>
+        <p:nvSpPr>
+          <p:cNvPr id="4" name="Rectangle 3"/>
+          <p:cNvSpPr/>
           <p:nvPr/>
-        </p:nvGrpSpPr>
-        <p:grpSpPr>
+        </p:nvSpPr>
+        <p:spPr>
           <a:xfrm>
-            <a:off x="1665075" y="2279822"/>
-            <a:ext cx="5406081" cy="1530178"/>
-            <a:chOff x="1665075" y="2279822"/>
-            <a:chExt cx="5406081" cy="1530178"/>
-          </a:xfrm>
-        </p:grpSpPr>
-        <p:sp>
-          <p:nvSpPr>
-            <p:cNvPr id="4" name="Rectangle 3"/>
-            <p:cNvSpPr/>
-            <p:nvPr/>
-          </p:nvSpPr>
-          <p:spPr>
-            <a:xfrm>
-              <a:off x="1665075" y="2286000"/>
-              <a:ext cx="685800" cy="609600"/>
-            </a:xfrm>
-            <a:prstGeom prst="rect">
-              <a:avLst/>
-            </a:prstGeom>
-          </p:spPr>
-          <p:style>
-            <a:lnRef idx="2">
-              <a:schemeClr val="accent1">
-                <a:shade val="50000"/>
-              </a:schemeClr>
-            </a:lnRef>
-            <a:fillRef idx="1">
-              <a:schemeClr val="accent1"/>
-            </a:fillRef>
-            <a:effectRef idx="0">
-              <a:schemeClr val="accent1"/>
-            </a:effectRef>
-            <a:fontRef idx="minor">
-              <a:schemeClr val="lt1"/>
-            </a:fontRef>
-          </p:style>
-          <p:txBody>
-            <a:bodyPr rtlCol="0" anchor="ctr"/>
-            <a:lstStyle/>
-            <a:p>
-              <a:pPr algn="ctr"/>
-              <a:r>
-                <a:rPr lang="en-US" sz="1050" dirty="0" smtClean="0"/>
-                <a:t>Program Counter</a:t>
-              </a:r>
-              <a:endParaRPr lang="en-US" sz="1050" dirty="0"/>
-            </a:p>
-          </p:txBody>
-        </p:sp>
-        <p:sp>
-          <p:nvSpPr>
-            <p:cNvPr id="5" name="Rectangle 4"/>
-            <p:cNvSpPr/>
-            <p:nvPr/>
-          </p:nvSpPr>
-          <p:spPr>
-            <a:xfrm>
-              <a:off x="2579475" y="2279822"/>
-              <a:ext cx="838200" cy="615778"/>
-            </a:xfrm>
-            <a:prstGeom prst="rect">
-              <a:avLst/>
-            </a:prstGeom>
-          </p:spPr>
-          <p:style>
-            <a:lnRef idx="2">
-              <a:schemeClr val="accent1">
-                <a:shade val="50000"/>
-              </a:schemeClr>
-            </a:lnRef>
-            <a:fillRef idx="1">
-              <a:schemeClr val="accent1"/>
-            </a:fillRef>
-            <a:effectRef idx="0">
-              <a:schemeClr val="accent1"/>
-            </a:effectRef>
-            <a:fontRef idx="minor">
-              <a:schemeClr val="lt1"/>
-            </a:fontRef>
-          </p:style>
-          <p:txBody>
-            <a:bodyPr rtlCol="0" anchor="ctr"/>
-            <a:lstStyle/>
-            <a:p>
-              <a:pPr algn="ctr"/>
-              <a:r>
-                <a:rPr lang="en-US" sz="1050" dirty="0" smtClean="0"/>
-                <a:t>Instruction ROM</a:t>
-              </a:r>
-              <a:endParaRPr lang="en-US" sz="1050" dirty="0"/>
-            </a:p>
-          </p:txBody>
-        </p:sp>
-        <p:sp>
-          <p:nvSpPr>
-            <p:cNvPr id="6" name="Rectangle 5"/>
-            <p:cNvSpPr/>
-            <p:nvPr/>
-          </p:nvSpPr>
-          <p:spPr>
-            <a:xfrm>
-              <a:off x="3650394" y="2279822"/>
-              <a:ext cx="681681" cy="615778"/>
-            </a:xfrm>
-            <a:prstGeom prst="rect">
-              <a:avLst/>
-            </a:prstGeom>
-          </p:spPr>
-          <p:style>
-            <a:lnRef idx="2">
-              <a:schemeClr val="accent1">
-                <a:shade val="50000"/>
-              </a:schemeClr>
-            </a:lnRef>
-            <a:fillRef idx="1">
-              <a:schemeClr val="accent1"/>
-            </a:fillRef>
-            <a:effectRef idx="0">
-              <a:schemeClr val="accent1"/>
-            </a:effectRef>
-            <a:fontRef idx="minor">
-              <a:schemeClr val="lt1"/>
-            </a:fontRef>
-          </p:style>
-          <p:txBody>
-            <a:bodyPr rtlCol="0" anchor="ctr"/>
-            <a:lstStyle/>
-            <a:p>
-              <a:pPr algn="ctr"/>
-              <a:r>
-                <a:rPr lang="en-US" sz="1050" dirty="0" err="1" smtClean="0"/>
-                <a:t>Opcode</a:t>
-              </a:r>
-              <a:endParaRPr lang="en-US" sz="1050" dirty="0" smtClean="0"/>
-            </a:p>
-            <a:p>
-              <a:pPr algn="ctr"/>
-              <a:r>
-                <a:rPr lang="en-US" sz="1050" dirty="0" smtClean="0"/>
-                <a:t>Decoder</a:t>
-              </a:r>
-              <a:endParaRPr lang="en-US" sz="1050" dirty="0"/>
-            </a:p>
-          </p:txBody>
-        </p:sp>
-        <p:sp>
-          <p:nvSpPr>
-            <p:cNvPr id="7" name="Rectangle 6"/>
-            <p:cNvSpPr/>
-            <p:nvPr/>
-          </p:nvSpPr>
-          <p:spPr>
-            <a:xfrm>
-              <a:off x="4576119" y="2279822"/>
-              <a:ext cx="681681" cy="1530178"/>
-            </a:xfrm>
-            <a:prstGeom prst="rect">
-              <a:avLst/>
-            </a:prstGeom>
-          </p:spPr>
-          <p:style>
-            <a:lnRef idx="2">
-              <a:schemeClr val="accent1">
-                <a:shade val="50000"/>
-              </a:schemeClr>
-            </a:lnRef>
-            <a:fillRef idx="1">
-              <a:schemeClr val="accent1"/>
-            </a:fillRef>
-            <a:effectRef idx="0">
-              <a:schemeClr val="accent1"/>
-            </a:effectRef>
-            <a:fontRef idx="minor">
-              <a:schemeClr val="lt1"/>
-            </a:fontRef>
-          </p:style>
-          <p:txBody>
-            <a:bodyPr rtlCol="0" anchor="ctr"/>
-            <a:lstStyle/>
-            <a:p>
-              <a:pPr algn="ctr"/>
-              <a:r>
-                <a:rPr lang="en-US" sz="1050" dirty="0" err="1" smtClean="0"/>
-                <a:t>RegisterFile</a:t>
-              </a:r>
-              <a:endParaRPr lang="en-US" sz="1050" dirty="0"/>
-            </a:p>
-          </p:txBody>
-        </p:sp>
-        <p:sp>
-          <p:nvSpPr>
-            <p:cNvPr id="8" name="Rectangle 7"/>
-            <p:cNvSpPr/>
-            <p:nvPr/>
-          </p:nvSpPr>
-          <p:spPr>
-            <a:xfrm>
-              <a:off x="5475075" y="2286000"/>
-              <a:ext cx="681681" cy="609600"/>
-            </a:xfrm>
-            <a:prstGeom prst="rect">
-              <a:avLst/>
-            </a:prstGeom>
-          </p:spPr>
-          <p:style>
-            <a:lnRef idx="2">
-              <a:schemeClr val="accent1">
-                <a:shade val="50000"/>
-              </a:schemeClr>
-            </a:lnRef>
-            <a:fillRef idx="1">
-              <a:schemeClr val="accent1"/>
-            </a:fillRef>
-            <a:effectRef idx="0">
-              <a:schemeClr val="accent1"/>
-            </a:effectRef>
-            <a:fontRef idx="minor">
-              <a:schemeClr val="lt1"/>
-            </a:fontRef>
-          </p:style>
-          <p:txBody>
-            <a:bodyPr rtlCol="0" anchor="ctr"/>
-            <a:lstStyle/>
-            <a:p>
-              <a:pPr algn="ctr"/>
-              <a:r>
-                <a:rPr lang="en-US" sz="1050" dirty="0" smtClean="0"/>
-                <a:t>ALU</a:t>
-              </a:r>
-              <a:endParaRPr lang="en-US" sz="1050" dirty="0"/>
-            </a:p>
-          </p:txBody>
-        </p:sp>
-        <p:sp>
-          <p:nvSpPr>
-            <p:cNvPr id="9" name="Rectangle 8"/>
-            <p:cNvSpPr/>
-            <p:nvPr/>
-          </p:nvSpPr>
-          <p:spPr>
-            <a:xfrm>
-              <a:off x="6389475" y="2286000"/>
-              <a:ext cx="681681" cy="609600"/>
-            </a:xfrm>
-            <a:prstGeom prst="rect">
-              <a:avLst/>
-            </a:prstGeom>
-          </p:spPr>
-          <p:style>
-            <a:lnRef idx="2">
-              <a:schemeClr val="accent1">
-                <a:shade val="50000"/>
-              </a:schemeClr>
-            </a:lnRef>
-            <a:fillRef idx="1">
-              <a:schemeClr val="accent1"/>
-            </a:fillRef>
-            <a:effectRef idx="0">
-              <a:schemeClr val="accent1"/>
-            </a:effectRef>
-            <a:fontRef idx="minor">
-              <a:schemeClr val="lt1"/>
-            </a:fontRef>
-          </p:style>
-          <p:txBody>
-            <a:bodyPr rtlCol="0" anchor="ctr"/>
-            <a:lstStyle/>
-            <a:p>
-              <a:pPr algn="ctr"/>
-              <a:r>
-                <a:rPr lang="en-US" sz="1050" dirty="0" err="1" smtClean="0"/>
-                <a:t>RegisterFile</a:t>
-              </a:r>
-              <a:endParaRPr lang="en-US" sz="1050" dirty="0"/>
-            </a:p>
-          </p:txBody>
-        </p:sp>
-        <p:sp>
-          <p:nvSpPr>
-            <p:cNvPr id="10" name="Right Arrow 9"/>
-            <p:cNvSpPr/>
-            <p:nvPr/>
-          </p:nvSpPr>
-          <p:spPr>
-            <a:xfrm>
-              <a:off x="2350875" y="2572266"/>
-              <a:ext cx="228600" cy="76200"/>
-            </a:xfrm>
-            <a:prstGeom prst="rightArrow">
-              <a:avLst/>
-            </a:prstGeom>
-          </p:spPr>
-          <p:style>
-            <a:lnRef idx="2">
-              <a:schemeClr val="accent1">
-                <a:shade val="50000"/>
-              </a:schemeClr>
-            </a:lnRef>
-            <a:fillRef idx="1">
-              <a:schemeClr val="accent1"/>
-            </a:fillRef>
-            <a:effectRef idx="0">
-              <a:schemeClr val="accent1"/>
-            </a:effectRef>
-            <a:fontRef idx="minor">
-              <a:schemeClr val="lt1"/>
-            </a:fontRef>
-          </p:style>
-          <p:txBody>
-            <a:bodyPr rtlCol="0" anchor="ctr"/>
-            <a:lstStyle/>
-            <a:p>
-              <a:pPr algn="ctr"/>
-              <a:endParaRPr lang="en-US"/>
-            </a:p>
-          </p:txBody>
-        </p:sp>
-        <p:sp>
-          <p:nvSpPr>
-            <p:cNvPr id="11" name="Right Arrow 10"/>
-            <p:cNvSpPr/>
-            <p:nvPr/>
-          </p:nvSpPr>
-          <p:spPr>
-            <a:xfrm>
-              <a:off x="3417675" y="2567118"/>
-              <a:ext cx="228600" cy="76200"/>
-            </a:xfrm>
-            <a:prstGeom prst="rightArrow">
-              <a:avLst/>
-            </a:prstGeom>
-          </p:spPr>
-          <p:style>
-            <a:lnRef idx="2">
-              <a:schemeClr val="accent1">
-                <a:shade val="50000"/>
-              </a:schemeClr>
-            </a:lnRef>
-            <a:fillRef idx="1">
-              <a:schemeClr val="accent1"/>
-            </a:fillRef>
-            <a:effectRef idx="0">
-              <a:schemeClr val="accent1"/>
-            </a:effectRef>
-            <a:fontRef idx="minor">
-              <a:schemeClr val="lt1"/>
-            </a:fontRef>
-          </p:style>
-          <p:txBody>
-            <a:bodyPr rtlCol="0" anchor="ctr"/>
-            <a:lstStyle/>
-            <a:p>
-              <a:pPr algn="ctr"/>
-              <a:endParaRPr lang="en-US"/>
-            </a:p>
-          </p:txBody>
-        </p:sp>
-        <p:sp>
-          <p:nvSpPr>
-            <p:cNvPr id="12" name="Right Arrow 11"/>
-            <p:cNvSpPr/>
-            <p:nvPr/>
-          </p:nvSpPr>
-          <p:spPr>
-            <a:xfrm>
-              <a:off x="4352670" y="2587711"/>
-              <a:ext cx="228600" cy="76200"/>
-            </a:xfrm>
-            <a:prstGeom prst="rightArrow">
-              <a:avLst/>
-            </a:prstGeom>
-          </p:spPr>
-          <p:style>
-            <a:lnRef idx="2">
-              <a:schemeClr val="accent1">
-                <a:shade val="50000"/>
-              </a:schemeClr>
-            </a:lnRef>
-            <a:fillRef idx="1">
-              <a:schemeClr val="accent1"/>
-            </a:fillRef>
-            <a:effectRef idx="0">
-              <a:schemeClr val="accent1"/>
-            </a:effectRef>
-            <a:fontRef idx="minor">
-              <a:schemeClr val="lt1"/>
-            </a:fontRef>
-          </p:style>
-          <p:txBody>
-            <a:bodyPr rtlCol="0" anchor="ctr"/>
-            <a:lstStyle/>
-            <a:p>
-              <a:pPr algn="ctr"/>
-              <a:endParaRPr lang="en-US"/>
-            </a:p>
-          </p:txBody>
-        </p:sp>
-        <p:sp>
-          <p:nvSpPr>
-            <p:cNvPr id="13" name="Right Arrow 12"/>
-            <p:cNvSpPr/>
-            <p:nvPr/>
-          </p:nvSpPr>
-          <p:spPr>
-            <a:xfrm>
-              <a:off x="5246475" y="2572266"/>
-              <a:ext cx="228600" cy="76200"/>
-            </a:xfrm>
-            <a:prstGeom prst="rightArrow">
-              <a:avLst/>
-            </a:prstGeom>
-          </p:spPr>
-          <p:style>
-            <a:lnRef idx="2">
-              <a:schemeClr val="accent1">
-                <a:shade val="50000"/>
-              </a:schemeClr>
-            </a:lnRef>
-            <a:fillRef idx="1">
-              <a:schemeClr val="accent1"/>
-            </a:fillRef>
-            <a:effectRef idx="0">
-              <a:schemeClr val="accent1"/>
-            </a:effectRef>
-            <a:fontRef idx="minor">
-              <a:schemeClr val="lt1"/>
-            </a:fontRef>
-          </p:style>
-          <p:txBody>
-            <a:bodyPr rtlCol="0" anchor="ctr"/>
-            <a:lstStyle/>
-            <a:p>
-              <a:pPr algn="ctr"/>
-              <a:endParaRPr lang="en-US"/>
-            </a:p>
-          </p:txBody>
-        </p:sp>
-        <p:sp>
-          <p:nvSpPr>
-            <p:cNvPr id="14" name="Right Arrow 13"/>
-            <p:cNvSpPr/>
-            <p:nvPr/>
-          </p:nvSpPr>
-          <p:spPr>
-            <a:xfrm>
-              <a:off x="6160875" y="2567118"/>
-              <a:ext cx="228600" cy="76200"/>
-            </a:xfrm>
-            <a:prstGeom prst="rightArrow">
-              <a:avLst/>
-            </a:prstGeom>
-          </p:spPr>
-          <p:style>
-            <a:lnRef idx="2">
-              <a:schemeClr val="accent1">
-                <a:shade val="50000"/>
-              </a:schemeClr>
-            </a:lnRef>
-            <a:fillRef idx="1">
-              <a:schemeClr val="accent1"/>
-            </a:fillRef>
-            <a:effectRef idx="0">
-              <a:schemeClr val="accent1"/>
-            </a:effectRef>
-            <a:fontRef idx="minor">
-              <a:schemeClr val="lt1"/>
-            </a:fontRef>
-          </p:style>
-          <p:txBody>
-            <a:bodyPr rtlCol="0" anchor="ctr"/>
-            <a:lstStyle/>
-            <a:p>
-              <a:pPr algn="ctr"/>
-              <a:endParaRPr lang="en-US"/>
-            </a:p>
-          </p:txBody>
-        </p:sp>
-      </p:grpSp>
+            <a:off x="1678459" y="2308655"/>
+            <a:ext cx="685800" cy="609600"/>
+          </a:xfrm>
+          <a:prstGeom prst="rect">
+            <a:avLst/>
+          </a:prstGeom>
+        </p:spPr>
+        <p:style>
+          <a:lnRef idx="2">
+            <a:schemeClr val="accent1">
+              <a:shade val="50000"/>
+            </a:schemeClr>
+          </a:lnRef>
+          <a:fillRef idx="1">
+            <a:schemeClr val="accent1"/>
+          </a:fillRef>
+          <a:effectRef idx="0">
+            <a:schemeClr val="accent1"/>
+          </a:effectRef>
+          <a:fontRef idx="minor">
+            <a:schemeClr val="lt1"/>
+          </a:fontRef>
+        </p:style>
+        <p:txBody>
+          <a:bodyPr rtlCol="0" anchor="ctr"/>
+          <a:lstStyle/>
+          <a:p>
+            <a:pPr algn="ctr"/>
+            <a:r>
+              <a:rPr lang="en-US" sz="1050" dirty="0" smtClean="0"/>
+              <a:t>Program Counter</a:t>
+            </a:r>
+            <a:endParaRPr lang="en-US" sz="1050" dirty="0"/>
+          </a:p>
+        </p:txBody>
+      </p:sp>
+      <p:sp>
+        <p:nvSpPr>
+          <p:cNvPr id="5" name="Rectangle 4"/>
+          <p:cNvSpPr/>
+          <p:nvPr/>
+        </p:nvSpPr>
+        <p:spPr>
+          <a:xfrm>
+            <a:off x="2592859" y="2302477"/>
+            <a:ext cx="838200" cy="615778"/>
+          </a:xfrm>
+          <a:prstGeom prst="rect">
+            <a:avLst/>
+          </a:prstGeom>
+        </p:spPr>
+        <p:style>
+          <a:lnRef idx="2">
+            <a:schemeClr val="accent1">
+              <a:shade val="50000"/>
+            </a:schemeClr>
+          </a:lnRef>
+          <a:fillRef idx="1">
+            <a:schemeClr val="accent1"/>
+          </a:fillRef>
+          <a:effectRef idx="0">
+            <a:schemeClr val="accent1"/>
+          </a:effectRef>
+          <a:fontRef idx="minor">
+            <a:schemeClr val="lt1"/>
+          </a:fontRef>
+        </p:style>
+        <p:txBody>
+          <a:bodyPr rtlCol="0" anchor="ctr"/>
+          <a:lstStyle/>
+          <a:p>
+            <a:pPr algn="ctr"/>
+            <a:r>
+              <a:rPr lang="en-US" sz="1050" dirty="0" smtClean="0"/>
+              <a:t>Instruction ROM</a:t>
+            </a:r>
+            <a:endParaRPr lang="en-US" sz="1050" dirty="0"/>
+          </a:p>
+        </p:txBody>
+      </p:sp>
+      <p:sp>
+        <p:nvSpPr>
+          <p:cNvPr id="6" name="Rectangle 5"/>
+          <p:cNvSpPr/>
+          <p:nvPr/>
+        </p:nvSpPr>
+        <p:spPr>
+          <a:xfrm>
+            <a:off x="3812059" y="2302477"/>
+            <a:ext cx="2895600" cy="615778"/>
+          </a:xfrm>
+          <a:prstGeom prst="rect">
+            <a:avLst/>
+          </a:prstGeom>
+        </p:spPr>
+        <p:style>
+          <a:lnRef idx="2">
+            <a:schemeClr val="accent1">
+              <a:shade val="50000"/>
+            </a:schemeClr>
+          </a:lnRef>
+          <a:fillRef idx="1">
+            <a:schemeClr val="accent1"/>
+          </a:fillRef>
+          <a:effectRef idx="0">
+            <a:schemeClr val="accent1"/>
+          </a:effectRef>
+          <a:fontRef idx="minor">
+            <a:schemeClr val="lt1"/>
+          </a:fontRef>
+        </p:style>
+        <p:txBody>
+          <a:bodyPr rtlCol="0" anchor="ctr"/>
+          <a:lstStyle/>
+          <a:p>
+            <a:pPr algn="ctr"/>
+            <a:r>
+              <a:rPr lang="en-US" sz="1050" dirty="0" err="1" smtClean="0"/>
+              <a:t>Opcode</a:t>
+            </a:r>
+            <a:endParaRPr lang="en-US" sz="1050" dirty="0" smtClean="0"/>
+          </a:p>
+          <a:p>
+            <a:pPr algn="ctr"/>
+            <a:r>
+              <a:rPr lang="en-US" sz="1050" dirty="0" smtClean="0"/>
+              <a:t>Decoder</a:t>
+            </a:r>
+            <a:endParaRPr lang="en-US" sz="1050" dirty="0"/>
+          </a:p>
+        </p:txBody>
+      </p:sp>
+      <p:sp>
+        <p:nvSpPr>
+          <p:cNvPr id="7" name="Rectangle 6"/>
+          <p:cNvSpPr/>
+          <p:nvPr/>
+        </p:nvSpPr>
+        <p:spPr>
+          <a:xfrm>
+            <a:off x="4901385" y="3161273"/>
+            <a:ext cx="681681" cy="609600"/>
+          </a:xfrm>
+          <a:prstGeom prst="rect">
+            <a:avLst/>
+          </a:prstGeom>
+        </p:spPr>
+        <p:style>
+          <a:lnRef idx="2">
+            <a:schemeClr val="accent1">
+              <a:shade val="50000"/>
+            </a:schemeClr>
+          </a:lnRef>
+          <a:fillRef idx="1">
+            <a:schemeClr val="accent1"/>
+          </a:fillRef>
+          <a:effectRef idx="0">
+            <a:schemeClr val="accent1"/>
+          </a:effectRef>
+          <a:fontRef idx="minor">
+            <a:schemeClr val="lt1"/>
+          </a:fontRef>
+        </p:style>
+        <p:txBody>
+          <a:bodyPr rtlCol="0" anchor="ctr"/>
+          <a:lstStyle/>
+          <a:p>
+            <a:pPr algn="ctr"/>
+            <a:r>
+              <a:rPr lang="en-US" sz="1050" dirty="0" err="1" smtClean="0"/>
+              <a:t>RegisterFile</a:t>
+            </a:r>
+            <a:endParaRPr lang="en-US" sz="1050" dirty="0"/>
+          </a:p>
+        </p:txBody>
+      </p:sp>
+      <p:sp>
+        <p:nvSpPr>
+          <p:cNvPr id="8" name="Rectangle 7"/>
+          <p:cNvSpPr/>
+          <p:nvPr/>
+        </p:nvSpPr>
+        <p:spPr>
+          <a:xfrm>
+            <a:off x="6025978" y="3146855"/>
+            <a:ext cx="681681" cy="609600"/>
+          </a:xfrm>
+          <a:prstGeom prst="rect">
+            <a:avLst/>
+          </a:prstGeom>
+        </p:spPr>
+        <p:style>
+          <a:lnRef idx="2">
+            <a:schemeClr val="accent1">
+              <a:shade val="50000"/>
+            </a:schemeClr>
+          </a:lnRef>
+          <a:fillRef idx="1">
+            <a:schemeClr val="accent1"/>
+          </a:fillRef>
+          <a:effectRef idx="0">
+            <a:schemeClr val="accent1"/>
+          </a:effectRef>
+          <a:fontRef idx="minor">
+            <a:schemeClr val="lt1"/>
+          </a:fontRef>
+        </p:style>
+        <p:txBody>
+          <a:bodyPr rtlCol="0" anchor="ctr"/>
+          <a:lstStyle/>
+          <a:p>
+            <a:pPr algn="ctr"/>
+            <a:r>
+              <a:rPr lang="en-US" sz="1050" dirty="0" smtClean="0"/>
+              <a:t>ALU</a:t>
+            </a:r>
+            <a:endParaRPr lang="en-US" sz="1050" dirty="0"/>
+          </a:p>
+        </p:txBody>
+      </p:sp>
+      <p:sp>
+        <p:nvSpPr>
+          <p:cNvPr id="10" name="Right Arrow 9"/>
+          <p:cNvSpPr/>
+          <p:nvPr/>
+        </p:nvSpPr>
+        <p:spPr>
+          <a:xfrm>
+            <a:off x="2364259" y="2594921"/>
+            <a:ext cx="228600" cy="76200"/>
+          </a:xfrm>
+          <a:prstGeom prst="rightArrow">
+            <a:avLst/>
+          </a:prstGeom>
+        </p:spPr>
+        <p:style>
+          <a:lnRef idx="2">
+            <a:schemeClr val="accent1">
+              <a:shade val="50000"/>
+            </a:schemeClr>
+          </a:lnRef>
+          <a:fillRef idx="1">
+            <a:schemeClr val="accent1"/>
+          </a:fillRef>
+          <a:effectRef idx="0">
+            <a:schemeClr val="accent1"/>
+          </a:effectRef>
+          <a:fontRef idx="minor">
+            <a:schemeClr val="lt1"/>
+          </a:fontRef>
+        </p:style>
+        <p:txBody>
+          <a:bodyPr rtlCol="0" anchor="ctr"/>
+          <a:lstStyle/>
+          <a:p>
+            <a:pPr algn="ctr"/>
+            <a:endParaRPr lang="en-US"/>
+          </a:p>
+        </p:txBody>
+      </p:sp>
+      <p:sp>
+        <p:nvSpPr>
+          <p:cNvPr id="11" name="Right Arrow 10"/>
+          <p:cNvSpPr/>
+          <p:nvPr/>
+        </p:nvSpPr>
+        <p:spPr>
+          <a:xfrm>
+            <a:off x="3431059" y="2568291"/>
+            <a:ext cx="338651" cy="76200"/>
+          </a:xfrm>
+          <a:prstGeom prst="rightArrow">
+            <a:avLst/>
+          </a:prstGeom>
+        </p:spPr>
+        <p:style>
+          <a:lnRef idx="2">
+            <a:schemeClr val="accent1">
+              <a:shade val="50000"/>
+            </a:schemeClr>
+          </a:lnRef>
+          <a:fillRef idx="1">
+            <a:schemeClr val="accent1"/>
+          </a:fillRef>
+          <a:effectRef idx="0">
+            <a:schemeClr val="accent1"/>
+          </a:effectRef>
+          <a:fontRef idx="minor">
+            <a:schemeClr val="lt1"/>
+          </a:fontRef>
+        </p:style>
+        <p:txBody>
+          <a:bodyPr rtlCol="0" anchor="ctr"/>
+          <a:lstStyle/>
+          <a:p>
+            <a:pPr algn="ctr"/>
+            <a:endParaRPr lang="en-US"/>
+          </a:p>
+        </p:txBody>
+      </p:sp>
+      <p:sp>
+        <p:nvSpPr>
+          <p:cNvPr id="12" name="Right Arrow 11"/>
+          <p:cNvSpPr/>
+          <p:nvPr/>
+        </p:nvSpPr>
+        <p:spPr>
+          <a:xfrm rot="5400000">
+            <a:off x="5135197" y="2994455"/>
+            <a:ext cx="228600" cy="76200"/>
+          </a:xfrm>
+          <a:prstGeom prst="rightArrow">
+            <a:avLst/>
+          </a:prstGeom>
+        </p:spPr>
+        <p:style>
+          <a:lnRef idx="2">
+            <a:schemeClr val="accent1">
+              <a:shade val="50000"/>
+            </a:schemeClr>
+          </a:lnRef>
+          <a:fillRef idx="1">
+            <a:schemeClr val="accent1"/>
+          </a:fillRef>
+          <a:effectRef idx="0">
+            <a:schemeClr val="accent1"/>
+          </a:effectRef>
+          <a:fontRef idx="minor">
+            <a:schemeClr val="lt1"/>
+          </a:fontRef>
+        </p:style>
+        <p:txBody>
+          <a:bodyPr rtlCol="0" anchor="ctr"/>
+          <a:lstStyle/>
+          <a:p>
+            <a:pPr algn="ctr"/>
+            <a:endParaRPr lang="en-US"/>
+          </a:p>
+        </p:txBody>
+      </p:sp>
+      <p:sp>
+        <p:nvSpPr>
+          <p:cNvPr id="13" name="Right Arrow 12"/>
+          <p:cNvSpPr/>
+          <p:nvPr/>
+        </p:nvSpPr>
+        <p:spPr>
+          <a:xfrm>
+            <a:off x="5588215" y="3413555"/>
+            <a:ext cx="433643" cy="76200"/>
+          </a:xfrm>
+          <a:prstGeom prst="rightArrow">
+            <a:avLst/>
+          </a:prstGeom>
+        </p:spPr>
+        <p:style>
+          <a:lnRef idx="2">
+            <a:schemeClr val="accent1">
+              <a:shade val="50000"/>
+            </a:schemeClr>
+          </a:lnRef>
+          <a:fillRef idx="1">
+            <a:schemeClr val="accent1"/>
+          </a:fillRef>
+          <a:effectRef idx="0">
+            <a:schemeClr val="accent1"/>
+          </a:effectRef>
+          <a:fontRef idx="minor">
+            <a:schemeClr val="lt1"/>
+          </a:fontRef>
+        </p:style>
+        <p:txBody>
+          <a:bodyPr rtlCol="0" anchor="ctr"/>
+          <a:lstStyle/>
+          <a:p>
+            <a:pPr algn="ctr"/>
+            <a:endParaRPr lang="en-US"/>
+          </a:p>
+        </p:txBody>
+      </p:sp>
+      <p:sp>
+        <p:nvSpPr>
+          <p:cNvPr id="14" name="Right Arrow 13"/>
+          <p:cNvSpPr/>
+          <p:nvPr/>
+        </p:nvSpPr>
+        <p:spPr>
+          <a:xfrm>
+            <a:off x="6711778" y="3413555"/>
+            <a:ext cx="388160" cy="76200"/>
+          </a:xfrm>
+          <a:prstGeom prst="rightArrow">
+            <a:avLst/>
+          </a:prstGeom>
+        </p:spPr>
+        <p:style>
+          <a:lnRef idx="2">
+            <a:schemeClr val="accent1">
+              <a:shade val="50000"/>
+            </a:schemeClr>
+          </a:lnRef>
+          <a:fillRef idx="1">
+            <a:schemeClr val="accent1"/>
+          </a:fillRef>
+          <a:effectRef idx="0">
+            <a:schemeClr val="accent1"/>
+          </a:effectRef>
+          <a:fontRef idx="minor">
+            <a:schemeClr val="lt1"/>
+          </a:fontRef>
+        </p:style>
+        <p:txBody>
+          <a:bodyPr rtlCol="0" anchor="ctr"/>
+          <a:lstStyle/>
+          <a:p>
+            <a:pPr algn="ctr"/>
+            <a:endParaRPr lang="en-US"/>
+          </a:p>
+        </p:txBody>
+      </p:sp>
+      <p:sp>
+        <p:nvSpPr>
+          <p:cNvPr id="3" name="TextBox 2"/>
+          <p:cNvSpPr txBox="1"/>
+          <p:nvPr/>
+        </p:nvSpPr>
+        <p:spPr>
+          <a:xfrm>
+            <a:off x="2318900" y="2396325"/>
+            <a:ext cx="319318" cy="246221"/>
+          </a:xfrm>
+          <a:prstGeom prst="rect">
+            <a:avLst/>
+          </a:prstGeom>
+          <a:noFill/>
+        </p:spPr>
+        <p:txBody>
+          <a:bodyPr wrap="none" rtlCol="0">
+            <a:spAutoFit/>
+          </a:bodyPr>
+          <a:lstStyle/>
+          <a:p>
+            <a:r>
+              <a:rPr lang="en-US" sz="1000" dirty="0" smtClean="0"/>
+              <a:t>PC</a:t>
+            </a:r>
+            <a:endParaRPr lang="en-US" sz="1000" dirty="0"/>
+          </a:p>
+        </p:txBody>
+      </p:sp>
+      <p:sp>
+        <p:nvSpPr>
+          <p:cNvPr id="16" name="TextBox 15"/>
+          <p:cNvSpPr txBox="1"/>
+          <p:nvPr/>
+        </p:nvSpPr>
+        <p:spPr>
+          <a:xfrm>
+            <a:off x="3385701" y="2376788"/>
+            <a:ext cx="421910" cy="246221"/>
+          </a:xfrm>
+          <a:prstGeom prst="rect">
+            <a:avLst/>
+          </a:prstGeom>
+          <a:noFill/>
+        </p:spPr>
+        <p:txBody>
+          <a:bodyPr wrap="none" rtlCol="0">
+            <a:spAutoFit/>
+          </a:bodyPr>
+          <a:lstStyle/>
+          <a:p>
+            <a:r>
+              <a:rPr lang="en-US" sz="1000" dirty="0" err="1" smtClean="0"/>
+              <a:t>Instr</a:t>
+            </a:r>
+            <a:endParaRPr lang="en-US" sz="1000" dirty="0"/>
+          </a:p>
+        </p:txBody>
+      </p:sp>
+      <p:sp>
+        <p:nvSpPr>
+          <p:cNvPr id="17" name="TextBox 16"/>
+          <p:cNvSpPr txBox="1"/>
+          <p:nvPr/>
+        </p:nvSpPr>
+        <p:spPr>
+          <a:xfrm>
+            <a:off x="5211397" y="2899892"/>
+            <a:ext cx="548548" cy="246221"/>
+          </a:xfrm>
+          <a:prstGeom prst="rect">
+            <a:avLst/>
+          </a:prstGeom>
+          <a:noFill/>
+        </p:spPr>
+        <p:txBody>
+          <a:bodyPr wrap="none" rtlCol="0">
+            <a:spAutoFit/>
+          </a:bodyPr>
+          <a:lstStyle/>
+          <a:p>
+            <a:r>
+              <a:rPr lang="en-US" sz="1000" dirty="0" smtClean="0"/>
+              <a:t>Selects</a:t>
+            </a:r>
+            <a:endParaRPr lang="en-US" sz="1000" dirty="0"/>
+          </a:p>
+        </p:txBody>
+      </p:sp>
+      <p:sp>
+        <p:nvSpPr>
+          <p:cNvPr id="18" name="TextBox 17"/>
+          <p:cNvSpPr txBox="1"/>
+          <p:nvPr/>
+        </p:nvSpPr>
+        <p:spPr>
+          <a:xfrm>
+            <a:off x="5569490" y="3070655"/>
+            <a:ext cx="452368" cy="400110"/>
+          </a:xfrm>
+          <a:prstGeom prst="rect">
+            <a:avLst/>
+          </a:prstGeom>
+          <a:noFill/>
+        </p:spPr>
+        <p:txBody>
+          <a:bodyPr wrap="none" rtlCol="0">
+            <a:spAutoFit/>
+          </a:bodyPr>
+          <a:lstStyle/>
+          <a:p>
+            <a:r>
+              <a:rPr lang="en-US" sz="1000" dirty="0" err="1" smtClean="0"/>
+              <a:t>RegA</a:t>
+            </a:r>
+            <a:endParaRPr lang="en-US" sz="1000" dirty="0" smtClean="0"/>
+          </a:p>
+          <a:p>
+            <a:r>
+              <a:rPr lang="en-US" sz="1000" dirty="0" err="1" smtClean="0"/>
+              <a:t>RegB</a:t>
+            </a:r>
+            <a:endParaRPr lang="en-US" sz="1000" dirty="0"/>
+          </a:p>
+        </p:txBody>
+      </p:sp>
+      <p:sp>
+        <p:nvSpPr>
+          <p:cNvPr id="19" name="TextBox 18"/>
+          <p:cNvSpPr txBox="1"/>
+          <p:nvPr/>
+        </p:nvSpPr>
+        <p:spPr>
+          <a:xfrm>
+            <a:off x="6707659" y="3070655"/>
+            <a:ext cx="394660" cy="400110"/>
+          </a:xfrm>
+          <a:prstGeom prst="rect">
+            <a:avLst/>
+          </a:prstGeom>
+          <a:noFill/>
+        </p:spPr>
+        <p:txBody>
+          <a:bodyPr wrap="none" rtlCol="0">
+            <a:spAutoFit/>
+          </a:bodyPr>
+          <a:lstStyle/>
+          <a:p>
+            <a:pPr algn="ctr"/>
+            <a:r>
+              <a:rPr lang="en-US" sz="1000" dirty="0" smtClean="0"/>
+              <a:t>ALU</a:t>
+            </a:r>
+          </a:p>
+          <a:p>
+            <a:pPr algn="ctr"/>
+            <a:r>
+              <a:rPr lang="en-US" sz="1000" dirty="0" smtClean="0"/>
+              <a:t>Out</a:t>
+            </a:r>
+            <a:endParaRPr lang="en-US" sz="1000" dirty="0"/>
+          </a:p>
+        </p:txBody>
+      </p:sp>
+      <p:sp>
+        <p:nvSpPr>
+          <p:cNvPr id="20" name="Rectangle 19"/>
+          <p:cNvSpPr/>
+          <p:nvPr/>
+        </p:nvSpPr>
+        <p:spPr>
+          <a:xfrm>
+            <a:off x="3812059" y="3146855"/>
+            <a:ext cx="681681" cy="609600"/>
+          </a:xfrm>
+          <a:prstGeom prst="rect">
+            <a:avLst/>
+          </a:prstGeom>
+        </p:spPr>
+        <p:style>
+          <a:lnRef idx="2">
+            <a:schemeClr val="accent1">
+              <a:shade val="50000"/>
+            </a:schemeClr>
+          </a:lnRef>
+          <a:fillRef idx="1">
+            <a:schemeClr val="accent1"/>
+          </a:fillRef>
+          <a:effectRef idx="0">
+            <a:schemeClr val="accent1"/>
+          </a:effectRef>
+          <a:fontRef idx="minor">
+            <a:schemeClr val="lt1"/>
+          </a:fontRef>
+        </p:style>
+        <p:txBody>
+          <a:bodyPr rtlCol="0" anchor="ctr"/>
+          <a:lstStyle/>
+          <a:p>
+            <a:pPr algn="ctr"/>
+            <a:r>
+              <a:rPr lang="en-US" sz="1050" dirty="0" smtClean="0"/>
+              <a:t>Mux</a:t>
+            </a:r>
+            <a:endParaRPr lang="en-US" sz="1050" dirty="0"/>
+          </a:p>
+        </p:txBody>
+      </p:sp>
+      <p:sp>
+        <p:nvSpPr>
+          <p:cNvPr id="21" name="Right Arrow 20"/>
+          <p:cNvSpPr/>
+          <p:nvPr/>
+        </p:nvSpPr>
+        <p:spPr>
+          <a:xfrm>
+            <a:off x="4497859" y="3408863"/>
+            <a:ext cx="388160" cy="76200"/>
+          </a:xfrm>
+          <a:prstGeom prst="rightArrow">
+            <a:avLst/>
+          </a:prstGeom>
+        </p:spPr>
+        <p:style>
+          <a:lnRef idx="2">
+            <a:schemeClr val="accent1">
+              <a:shade val="50000"/>
+            </a:schemeClr>
+          </a:lnRef>
+          <a:fillRef idx="1">
+            <a:schemeClr val="accent1"/>
+          </a:fillRef>
+          <a:effectRef idx="0">
+            <a:schemeClr val="accent1"/>
+          </a:effectRef>
+          <a:fontRef idx="minor">
+            <a:schemeClr val="lt1"/>
+          </a:fontRef>
+        </p:style>
+        <p:txBody>
+          <a:bodyPr rtlCol="0" anchor="ctr"/>
+          <a:lstStyle/>
+          <a:p>
+            <a:pPr algn="ctr"/>
+            <a:endParaRPr lang="en-US"/>
+          </a:p>
+        </p:txBody>
+      </p:sp>
+      <p:sp>
+        <p:nvSpPr>
+          <p:cNvPr id="22" name="TextBox 21"/>
+          <p:cNvSpPr txBox="1"/>
+          <p:nvPr/>
+        </p:nvSpPr>
+        <p:spPr>
+          <a:xfrm>
+            <a:off x="4497859" y="3065963"/>
+            <a:ext cx="403525" cy="400110"/>
+          </a:xfrm>
+          <a:prstGeom prst="rect">
+            <a:avLst/>
+          </a:prstGeom>
+          <a:noFill/>
+        </p:spPr>
+        <p:txBody>
+          <a:bodyPr wrap="square" rtlCol="0">
+            <a:spAutoFit/>
+          </a:bodyPr>
+          <a:lstStyle/>
+          <a:p>
+            <a:r>
+              <a:rPr lang="en-US" sz="1000" dirty="0" smtClean="0"/>
+              <a:t>ALU</a:t>
+            </a:r>
+          </a:p>
+          <a:p>
+            <a:pPr algn="ctr"/>
+            <a:r>
+              <a:rPr lang="en-US" sz="1000" dirty="0" smtClean="0"/>
+              <a:t>In</a:t>
+            </a:r>
+            <a:endParaRPr lang="en-US" sz="1000" dirty="0"/>
+          </a:p>
+        </p:txBody>
+      </p:sp>
+      <p:sp>
+        <p:nvSpPr>
+          <p:cNvPr id="23" name="Right Arrow 22"/>
+          <p:cNvSpPr/>
+          <p:nvPr/>
+        </p:nvSpPr>
+        <p:spPr>
+          <a:xfrm rot="10800000">
+            <a:off x="3392957" y="3956480"/>
+            <a:ext cx="3694429" cy="76200"/>
+          </a:xfrm>
+          <a:prstGeom prst="rightArrow">
+            <a:avLst/>
+          </a:prstGeom>
+        </p:spPr>
+        <p:style>
+          <a:lnRef idx="2">
+            <a:schemeClr val="accent1">
+              <a:shade val="50000"/>
+            </a:schemeClr>
+          </a:lnRef>
+          <a:fillRef idx="1">
+            <a:schemeClr val="accent1"/>
+          </a:fillRef>
+          <a:effectRef idx="0">
+            <a:schemeClr val="accent1"/>
+          </a:effectRef>
+          <a:fontRef idx="minor">
+            <a:schemeClr val="lt1"/>
+          </a:fontRef>
+        </p:style>
+        <p:txBody>
+          <a:bodyPr rtlCol="0" anchor="ctr"/>
+          <a:lstStyle/>
+          <a:p>
+            <a:pPr algn="ctr"/>
+            <a:endParaRPr lang="en-US"/>
+          </a:p>
+        </p:txBody>
+      </p:sp>
+      <p:sp>
+        <p:nvSpPr>
+          <p:cNvPr id="24" name="Right Arrow 23"/>
+          <p:cNvSpPr/>
+          <p:nvPr/>
+        </p:nvSpPr>
+        <p:spPr>
+          <a:xfrm>
+            <a:off x="3405253" y="3527855"/>
+            <a:ext cx="388160" cy="76200"/>
+          </a:xfrm>
+          <a:prstGeom prst="rightArrow">
+            <a:avLst/>
+          </a:prstGeom>
+        </p:spPr>
+        <p:style>
+          <a:lnRef idx="2">
+            <a:schemeClr val="accent1">
+              <a:shade val="50000"/>
+            </a:schemeClr>
+          </a:lnRef>
+          <a:fillRef idx="1">
+            <a:schemeClr val="accent1"/>
+          </a:fillRef>
+          <a:effectRef idx="0">
+            <a:schemeClr val="accent1"/>
+          </a:effectRef>
+          <a:fontRef idx="minor">
+            <a:schemeClr val="lt1"/>
+          </a:fontRef>
+        </p:style>
+        <p:txBody>
+          <a:bodyPr rtlCol="0" anchor="ctr"/>
+          <a:lstStyle/>
+          <a:p>
+            <a:pPr algn="ctr"/>
+            <a:endParaRPr lang="en-US"/>
+          </a:p>
+        </p:txBody>
+      </p:sp>
+      <p:sp>
+        <p:nvSpPr>
+          <p:cNvPr id="25" name="Right Arrow 24"/>
+          <p:cNvSpPr/>
+          <p:nvPr/>
+        </p:nvSpPr>
+        <p:spPr>
+          <a:xfrm rot="16200000">
+            <a:off x="3178645" y="3742167"/>
+            <a:ext cx="428625" cy="76200"/>
+          </a:xfrm>
+          <a:prstGeom prst="rightArrow">
+            <a:avLst/>
+          </a:prstGeom>
+        </p:spPr>
+        <p:style>
+          <a:lnRef idx="2">
+            <a:schemeClr val="accent1">
+              <a:shade val="50000"/>
+            </a:schemeClr>
+          </a:lnRef>
+          <a:fillRef idx="1">
+            <a:schemeClr val="accent1"/>
+          </a:fillRef>
+          <a:effectRef idx="0">
+            <a:schemeClr val="accent1"/>
+          </a:effectRef>
+          <a:fontRef idx="minor">
+            <a:schemeClr val="lt1"/>
+          </a:fontRef>
+        </p:style>
+        <p:txBody>
+          <a:bodyPr rtlCol="0" anchor="ctr"/>
+          <a:lstStyle/>
+          <a:p>
+            <a:pPr algn="ctr"/>
+            <a:endParaRPr lang="en-US"/>
+          </a:p>
+        </p:txBody>
+      </p:sp>
+      <p:sp>
+        <p:nvSpPr>
+          <p:cNvPr id="26" name="Right Arrow 25"/>
+          <p:cNvSpPr/>
+          <p:nvPr/>
+        </p:nvSpPr>
+        <p:spPr>
+          <a:xfrm rot="5400000">
+            <a:off x="6834890" y="3678733"/>
+            <a:ext cx="530096" cy="76200"/>
+          </a:xfrm>
+          <a:prstGeom prst="rightArrow">
+            <a:avLst/>
+          </a:prstGeom>
+        </p:spPr>
+        <p:style>
+          <a:lnRef idx="2">
+            <a:schemeClr val="accent1">
+              <a:shade val="50000"/>
+            </a:schemeClr>
+          </a:lnRef>
+          <a:fillRef idx="1">
+            <a:schemeClr val="accent1"/>
+          </a:fillRef>
+          <a:effectRef idx="0">
+            <a:schemeClr val="accent1"/>
+          </a:effectRef>
+          <a:fontRef idx="minor">
+            <a:schemeClr val="lt1"/>
+          </a:fontRef>
+        </p:style>
+        <p:txBody>
+          <a:bodyPr rtlCol="0" anchor="ctr"/>
+          <a:lstStyle/>
+          <a:p>
+            <a:pPr algn="ctr"/>
+            <a:endParaRPr lang="en-US"/>
+          </a:p>
+        </p:txBody>
+      </p:sp>
+      <p:sp>
+        <p:nvSpPr>
+          <p:cNvPr id="27" name="Right Arrow 26"/>
+          <p:cNvSpPr/>
+          <p:nvPr/>
+        </p:nvSpPr>
+        <p:spPr>
+          <a:xfrm rot="5400000">
+            <a:off x="6290618" y="3009615"/>
+            <a:ext cx="228600" cy="76200"/>
+          </a:xfrm>
+          <a:prstGeom prst="rightArrow">
+            <a:avLst/>
+          </a:prstGeom>
+        </p:spPr>
+        <p:style>
+          <a:lnRef idx="2">
+            <a:schemeClr val="accent1">
+              <a:shade val="50000"/>
+            </a:schemeClr>
+          </a:lnRef>
+          <a:fillRef idx="1">
+            <a:schemeClr val="accent1"/>
+          </a:fillRef>
+          <a:effectRef idx="0">
+            <a:schemeClr val="accent1"/>
+          </a:effectRef>
+          <a:fontRef idx="minor">
+            <a:schemeClr val="lt1"/>
+          </a:fontRef>
+        </p:style>
+        <p:txBody>
+          <a:bodyPr rtlCol="0" anchor="ctr"/>
+          <a:lstStyle/>
+          <a:p>
+            <a:pPr algn="ctr"/>
+            <a:endParaRPr lang="en-US"/>
+          </a:p>
+        </p:txBody>
+      </p:sp>
+      <p:sp>
+        <p:nvSpPr>
+          <p:cNvPr id="28" name="TextBox 27"/>
+          <p:cNvSpPr txBox="1"/>
+          <p:nvPr/>
+        </p:nvSpPr>
+        <p:spPr>
+          <a:xfrm>
+            <a:off x="6366818" y="2915052"/>
+            <a:ext cx="548548" cy="246221"/>
+          </a:xfrm>
+          <a:prstGeom prst="rect">
+            <a:avLst/>
+          </a:prstGeom>
+          <a:noFill/>
+        </p:spPr>
+        <p:txBody>
+          <a:bodyPr wrap="none" rtlCol="0">
+            <a:spAutoFit/>
+          </a:bodyPr>
+          <a:lstStyle/>
+          <a:p>
+            <a:r>
+              <a:rPr lang="en-US" sz="1000" dirty="0" smtClean="0"/>
+              <a:t>Selects</a:t>
+            </a:r>
+            <a:endParaRPr lang="en-US" sz="1000" dirty="0"/>
+          </a:p>
+        </p:txBody>
+      </p:sp>
+      <p:sp>
+        <p:nvSpPr>
+          <p:cNvPr id="29" name="Right Arrow 28"/>
+          <p:cNvSpPr/>
+          <p:nvPr/>
+        </p:nvSpPr>
+        <p:spPr>
+          <a:xfrm rot="5400000">
+            <a:off x="4076699" y="2993713"/>
+            <a:ext cx="228600" cy="76200"/>
+          </a:xfrm>
+          <a:prstGeom prst="rightArrow">
+            <a:avLst/>
+          </a:prstGeom>
+        </p:spPr>
+        <p:style>
+          <a:lnRef idx="2">
+            <a:schemeClr val="accent1">
+              <a:shade val="50000"/>
+            </a:schemeClr>
+          </a:lnRef>
+          <a:fillRef idx="1">
+            <a:schemeClr val="accent1"/>
+          </a:fillRef>
+          <a:effectRef idx="0">
+            <a:schemeClr val="accent1"/>
+          </a:effectRef>
+          <a:fontRef idx="minor">
+            <a:schemeClr val="lt1"/>
+          </a:fontRef>
+        </p:style>
+        <p:txBody>
+          <a:bodyPr rtlCol="0" anchor="ctr"/>
+          <a:lstStyle/>
+          <a:p>
+            <a:pPr algn="ctr"/>
+            <a:endParaRPr lang="en-US"/>
+          </a:p>
+        </p:txBody>
+      </p:sp>
+      <p:sp>
+        <p:nvSpPr>
+          <p:cNvPr id="30" name="TextBox 29"/>
+          <p:cNvSpPr txBox="1"/>
+          <p:nvPr/>
+        </p:nvSpPr>
+        <p:spPr>
+          <a:xfrm>
+            <a:off x="4152899" y="2899150"/>
+            <a:ext cx="548548" cy="246221"/>
+          </a:xfrm>
+          <a:prstGeom prst="rect">
+            <a:avLst/>
+          </a:prstGeom>
+          <a:noFill/>
+        </p:spPr>
+        <p:txBody>
+          <a:bodyPr wrap="none" rtlCol="0">
+            <a:spAutoFit/>
+          </a:bodyPr>
+          <a:lstStyle/>
+          <a:p>
+            <a:r>
+              <a:rPr lang="en-US" sz="1000" dirty="0" smtClean="0"/>
+              <a:t>Selects</a:t>
+            </a:r>
+            <a:endParaRPr lang="en-US" sz="1000" dirty="0"/>
+          </a:p>
+        </p:txBody>
+      </p:sp>
+      <p:sp>
+        <p:nvSpPr>
+          <p:cNvPr id="31" name="Right Arrow 30"/>
+          <p:cNvSpPr/>
+          <p:nvPr/>
+        </p:nvSpPr>
+        <p:spPr>
+          <a:xfrm>
+            <a:off x="3405253" y="3267965"/>
+            <a:ext cx="388160" cy="76200"/>
+          </a:xfrm>
+          <a:prstGeom prst="rightArrow">
+            <a:avLst/>
+          </a:prstGeom>
+        </p:spPr>
+        <p:style>
+          <a:lnRef idx="2">
+            <a:schemeClr val="accent1">
+              <a:shade val="50000"/>
+            </a:schemeClr>
+          </a:lnRef>
+          <a:fillRef idx="1">
+            <a:schemeClr val="accent1"/>
+          </a:fillRef>
+          <a:effectRef idx="0">
+            <a:schemeClr val="accent1"/>
+          </a:effectRef>
+          <a:fontRef idx="minor">
+            <a:schemeClr val="lt1"/>
+          </a:fontRef>
+        </p:style>
+        <p:txBody>
+          <a:bodyPr rtlCol="0" anchor="ctr"/>
+          <a:lstStyle/>
+          <a:p>
+            <a:pPr algn="ctr"/>
+            <a:endParaRPr lang="en-US"/>
+          </a:p>
+        </p:txBody>
+      </p:sp>
+      <p:sp>
+        <p:nvSpPr>
+          <p:cNvPr id="32" name="TextBox 31"/>
+          <p:cNvSpPr txBox="1"/>
+          <p:nvPr/>
+        </p:nvSpPr>
+        <p:spPr>
+          <a:xfrm>
+            <a:off x="2862801" y="3022260"/>
+            <a:ext cx="522900" cy="553998"/>
+          </a:xfrm>
+          <a:prstGeom prst="rect">
+            <a:avLst/>
+          </a:prstGeom>
+          <a:noFill/>
+        </p:spPr>
+        <p:txBody>
+          <a:bodyPr wrap="none" rtlCol="0">
+            <a:spAutoFit/>
+          </a:bodyPr>
+          <a:lstStyle/>
+          <a:p>
+            <a:pPr algn="r"/>
+            <a:r>
+              <a:rPr lang="en-US" sz="1000" dirty="0" smtClean="0"/>
+              <a:t>Data,</a:t>
+            </a:r>
+          </a:p>
+          <a:p>
+            <a:pPr algn="r"/>
+            <a:r>
+              <a:rPr lang="en-US" sz="1000" dirty="0" smtClean="0"/>
+              <a:t>Stack,</a:t>
+            </a:r>
+          </a:p>
+          <a:p>
+            <a:pPr algn="r"/>
+            <a:r>
+              <a:rPr lang="en-US" sz="1000" dirty="0" err="1" smtClean="0"/>
+              <a:t>Periph</a:t>
+            </a:r>
+            <a:endParaRPr lang="en-US" sz="1000" dirty="0"/>
+          </a:p>
+        </p:txBody>
+      </p:sp>
     </p:spTree>
     <p:extLst>
       <p:ext uri="{BB962C8B-B14F-4D97-AF65-F5344CB8AC3E}">

</xml_diff>